<commit_message>
Ahora el la exposicion tiene nuevas imagenes  Your branch is up to date with 'origin/master'.
</commit_message>
<xml_diff>
--- a/exposicion.pptx
+++ b/exposicion.pptx
@@ -5,7 +5,7 @@
     <p:sldMasterId id="2147483661" r:id="rId1"/>
   </p:sldMasterIdLst>
   <p:notesMasterIdLst>
-    <p:notesMasterId r:id="rId59"/>
+    <p:notesMasterId r:id="rId60"/>
   </p:notesMasterIdLst>
   <p:sldIdLst>
     <p:sldId id="260" r:id="rId2"/>
@@ -42,39 +42,40 @@
     <p:sldId id="304" r:id="rId33"/>
     <p:sldId id="305" r:id="rId34"/>
     <p:sldId id="306" r:id="rId35"/>
-    <p:sldId id="307" r:id="rId36"/>
-    <p:sldId id="308" r:id="rId37"/>
-    <p:sldId id="309" r:id="rId38"/>
-    <p:sldId id="310" r:id="rId39"/>
-    <p:sldId id="314" r:id="rId40"/>
-    <p:sldId id="312" r:id="rId41"/>
-    <p:sldId id="313" r:id="rId42"/>
-    <p:sldId id="311" r:id="rId43"/>
-    <p:sldId id="315" r:id="rId44"/>
-    <p:sldId id="316" r:id="rId45"/>
-    <p:sldId id="317" r:id="rId46"/>
-    <p:sldId id="318" r:id="rId47"/>
-    <p:sldId id="319" r:id="rId48"/>
-    <p:sldId id="320" r:id="rId49"/>
-    <p:sldId id="321" r:id="rId50"/>
-    <p:sldId id="265" r:id="rId51"/>
-    <p:sldId id="266" r:id="rId52"/>
-    <p:sldId id="268" r:id="rId53"/>
-    <p:sldId id="269" r:id="rId54"/>
-    <p:sldId id="270" r:id="rId55"/>
-    <p:sldId id="271" r:id="rId56"/>
-    <p:sldId id="272" r:id="rId57"/>
-    <p:sldId id="273" r:id="rId58"/>
+    <p:sldId id="322" r:id="rId36"/>
+    <p:sldId id="307" r:id="rId37"/>
+    <p:sldId id="308" r:id="rId38"/>
+    <p:sldId id="309" r:id="rId39"/>
+    <p:sldId id="310" r:id="rId40"/>
+    <p:sldId id="314" r:id="rId41"/>
+    <p:sldId id="312" r:id="rId42"/>
+    <p:sldId id="313" r:id="rId43"/>
+    <p:sldId id="311" r:id="rId44"/>
+    <p:sldId id="315" r:id="rId45"/>
+    <p:sldId id="316" r:id="rId46"/>
+    <p:sldId id="317" r:id="rId47"/>
+    <p:sldId id="318" r:id="rId48"/>
+    <p:sldId id="319" r:id="rId49"/>
+    <p:sldId id="320" r:id="rId50"/>
+    <p:sldId id="321" r:id="rId51"/>
+    <p:sldId id="265" r:id="rId52"/>
+    <p:sldId id="266" r:id="rId53"/>
+    <p:sldId id="268" r:id="rId54"/>
+    <p:sldId id="269" r:id="rId55"/>
+    <p:sldId id="270" r:id="rId56"/>
+    <p:sldId id="271" r:id="rId57"/>
+    <p:sldId id="272" r:id="rId58"/>
+    <p:sldId id="273" r:id="rId59"/>
   </p:sldIdLst>
   <p:sldSz cx="9144000" cy="5143500" type="screen16x9"/>
   <p:notesSz cx="6858000" cy="9144000"/>
   <p:embeddedFontLst>
     <p:embeddedFont>
       <p:font typeface="Calibri" panose="020F0502020204030204" pitchFamily="34" charset="0"/>
-      <p:regular r:id="rId60"/>
-      <p:bold r:id="rId61"/>
-      <p:italic r:id="rId62"/>
-      <p:boldItalic r:id="rId63"/>
+      <p:regular r:id="rId61"/>
+      <p:bold r:id="rId62"/>
+      <p:italic r:id="rId63"/>
+      <p:boldItalic r:id="rId64"/>
     </p:embeddedFont>
   </p:embeddedFontLst>
   <p:defaultTextStyle>
@@ -13958,6 +13959,35 @@
           </a:p>
         </p:txBody>
       </p:sp>
+      <p:pic>
+        <p:nvPicPr>
+          <p:cNvPr id="2" name="Imagen 1">
+            <a:extLst>
+              <a:ext uri="{FF2B5EF4-FFF2-40B4-BE49-F238E27FC236}">
+                <a16:creationId xmlns:a16="http://schemas.microsoft.com/office/drawing/2014/main" id="{D3132DB9-1214-42B9-992D-341FFF7C210E}"/>
+              </a:ext>
+            </a:extLst>
+          </p:cNvPr>
+          <p:cNvPicPr>
+            <a:picLocks noChangeAspect="1"/>
+          </p:cNvPicPr>
+          <p:nvPr/>
+        </p:nvPicPr>
+        <p:blipFill rotWithShape="1">
+          <a:blip r:embed="rId3"/>
+          <a:srcRect r="73212" b="22604"/>
+          <a:stretch/>
+        </p:blipFill>
+        <p:spPr>
+          <a:xfrm>
+            <a:off x="560356" y="1557088"/>
+            <a:ext cx="4285297" cy="3589411"/>
+          </a:xfrm>
+          <a:prstGeom prst="rect">
+            <a:avLst/>
+          </a:prstGeom>
+        </p:spPr>
+      </p:pic>
     </p:spTree>
     <p:extLst>
       <p:ext uri="{BB962C8B-B14F-4D97-AF65-F5344CB8AC3E}">
@@ -13976,6 +14006,36 @@
   <p:cSld>
     <p:spTree>
       <p:nvGrpSpPr>
+        <p:cNvPr id="1" name=""/>
+        <p:cNvGrpSpPr/>
+        <p:nvPr/>
+      </p:nvGrpSpPr>
+      <p:grpSpPr>
+        <a:xfrm>
+          <a:off x="0" y="0"/>
+          <a:ext cx="0" cy="0"/>
+          <a:chOff x="0" y="0"/>
+          <a:chExt cx="0" cy="0"/>
+        </a:xfrm>
+      </p:grpSpPr>
+    </p:spTree>
+    <p:extLst>
+      <p:ext uri="{BB962C8B-B14F-4D97-AF65-F5344CB8AC3E}">
+        <p14:creationId xmlns:p14="http://schemas.microsoft.com/office/powerpoint/2010/main" val="370356277"/>
+      </p:ext>
+    </p:extLst>
+  </p:cSld>
+  <p:clrMapOvr>
+    <a:masterClrMapping/>
+  </p:clrMapOvr>
+</p:sld>
+</file>
+
+<file path=ppt/slides/slide36.xml><?xml version="1.0" encoding="utf-8"?>
+<p:sld xmlns:a="http://schemas.openxmlformats.org/drawingml/2006/main" xmlns:r="http://schemas.openxmlformats.org/officeDocument/2006/relationships" xmlns:p="http://schemas.openxmlformats.org/presentationml/2006/main">
+  <p:cSld>
+    <p:spTree>
+      <p:nvGrpSpPr>
         <p:cNvPr id="1" name="Shape 199"/>
         <p:cNvGrpSpPr/>
         <p:nvPr/>
@@ -14048,7 +14108,7 @@
 </p:sld>
 </file>
 
-<file path=ppt/slides/slide36.xml><?xml version="1.0" encoding="utf-8"?>
+<file path=ppt/slides/slide37.xml><?xml version="1.0" encoding="utf-8"?>
 <p:sld xmlns:a="http://schemas.openxmlformats.org/drawingml/2006/main" xmlns:r="http://schemas.openxmlformats.org/officeDocument/2006/relationships" xmlns:p="http://schemas.openxmlformats.org/presentationml/2006/main">
   <p:cSld>
     <p:spTree>
@@ -14251,7 +14311,7 @@
 </p:sld>
 </file>
 
-<file path=ppt/slides/slide37.xml><?xml version="1.0" encoding="utf-8"?>
+<file path=ppt/slides/slide38.xml><?xml version="1.0" encoding="utf-8"?>
 <p:sld xmlns:a="http://schemas.openxmlformats.org/drawingml/2006/main" xmlns:r="http://schemas.openxmlformats.org/officeDocument/2006/relationships" xmlns:p="http://schemas.openxmlformats.org/presentationml/2006/main">
   <p:cSld>
     <p:spTree>
@@ -14328,7 +14388,7 @@
 </p:sld>
 </file>
 
-<file path=ppt/slides/slide38.xml><?xml version="1.0" encoding="utf-8"?>
+<file path=ppt/slides/slide39.xml><?xml version="1.0" encoding="utf-8"?>
 <p:sld xmlns:a="http://schemas.openxmlformats.org/drawingml/2006/main" xmlns:r="http://schemas.openxmlformats.org/officeDocument/2006/relationships" xmlns:p="http://schemas.openxmlformats.org/presentationml/2006/main">
   <p:cSld>
     <p:spTree>
@@ -14522,83 +14582,6 @@
     <p:extLst>
       <p:ext uri="{BB962C8B-B14F-4D97-AF65-F5344CB8AC3E}">
         <p14:creationId xmlns:p14="http://schemas.microsoft.com/office/powerpoint/2010/main" val="3476294187"/>
-      </p:ext>
-    </p:extLst>
-  </p:cSld>
-  <p:clrMapOvr>
-    <a:masterClrMapping/>
-  </p:clrMapOvr>
-</p:sld>
-</file>
-
-<file path=ppt/slides/slide39.xml><?xml version="1.0" encoding="utf-8"?>
-<p:sld xmlns:a="http://schemas.openxmlformats.org/drawingml/2006/main" xmlns:r="http://schemas.openxmlformats.org/officeDocument/2006/relationships" xmlns:p="http://schemas.openxmlformats.org/presentationml/2006/main">
-  <p:cSld>
-    <p:spTree>
-      <p:nvGrpSpPr>
-        <p:cNvPr id="1" name="Shape 199"/>
-        <p:cNvGrpSpPr/>
-        <p:nvPr/>
-      </p:nvGrpSpPr>
-      <p:grpSpPr>
-        <a:xfrm>
-          <a:off x="0" y="0"/>
-          <a:ext cx="0" cy="0"/>
-          <a:chOff x="0" y="0"/>
-          <a:chExt cx="0" cy="0"/>
-        </a:xfrm>
-      </p:grpSpPr>
-      <p:sp>
-        <p:nvSpPr>
-          <p:cNvPr id="200" name="Shape 200"/>
-          <p:cNvSpPr txBox="1"/>
-          <p:nvPr/>
-        </p:nvSpPr>
-        <p:spPr>
-          <a:xfrm>
-            <a:off x="1747397" y="1968765"/>
-            <a:ext cx="5591670" cy="1107995"/>
-          </a:xfrm>
-          <a:prstGeom prst="rect">
-            <a:avLst/>
-          </a:prstGeom>
-          <a:noFill/>
-          <a:ln>
-            <a:noFill/>
-          </a:ln>
-        </p:spPr>
-        <p:txBody>
-          <a:bodyPr wrap="square" lIns="91425" tIns="45700" rIns="91425" bIns="45700" anchor="t" anchorCtr="0">
-            <a:noAutofit/>
-          </a:bodyPr>
-          <a:lstStyle/>
-          <a:p>
-            <a:pPr marL="0" marR="0" lvl="0" indent="0" algn="ctr" rtl="0">
-              <a:spcBef>
-                <a:spcPts val="0"/>
-              </a:spcBef>
-              <a:buSzPct val="25000"/>
-              <a:buNone/>
-            </a:pPr>
-            <a:r>
-              <a:rPr lang="es-ES" sz="6600" b="1" dirty="0">
-                <a:solidFill>
-                  <a:schemeClr val="lt1"/>
-                </a:solidFill>
-                <a:latin typeface="Calibri"/>
-                <a:ea typeface="Calibri"/>
-                <a:cs typeface="Calibri"/>
-                <a:sym typeface="Calibri"/>
-              </a:rPr>
-              <a:t>CAPÍTULO 10.</a:t>
-            </a:r>
-          </a:p>
-        </p:txBody>
-      </p:sp>
-    </p:spTree>
-    <p:extLst>
-      <p:ext uri="{BB962C8B-B14F-4D97-AF65-F5344CB8AC3E}">
-        <p14:creationId xmlns:p14="http://schemas.microsoft.com/office/powerpoint/2010/main" val="1136970480"/>
       </p:ext>
     </p:extLst>
   </p:cSld>
@@ -14685,7 +14668,7 @@
   <p:cSld>
     <p:spTree>
       <p:nvGrpSpPr>
-        <p:cNvPr id="1" name="Shape 129"/>
+        <p:cNvPr id="1" name="Shape 199"/>
         <p:cNvGrpSpPr/>
         <p:nvPr/>
       </p:nvGrpSpPr>
@@ -14699,14 +14682,14 @@
       </p:grpSpPr>
       <p:sp>
         <p:nvSpPr>
-          <p:cNvPr id="130" name="Shape 130"/>
+          <p:cNvPr id="200" name="Shape 200"/>
           <p:cNvSpPr txBox="1"/>
           <p:nvPr/>
         </p:nvSpPr>
         <p:spPr>
           <a:xfrm>
-            <a:off x="751336" y="190098"/>
-            <a:ext cx="3239373" cy="707886"/>
+            <a:off x="1747397" y="1968765"/>
+            <a:ext cx="5591670" cy="1107995"/>
           </a:xfrm>
           <a:prstGeom prst="rect">
             <a:avLst/>
@@ -14722,7 +14705,7 @@
           </a:bodyPr>
           <a:lstStyle/>
           <a:p>
-            <a:pPr marL="0" marR="0" lvl="0" indent="0" algn="l" rtl="0">
+            <a:pPr marL="0" marR="0" lvl="0" indent="0" algn="ctr" rtl="0">
               <a:spcBef>
                 <a:spcPts val="0"/>
               </a:spcBef>
@@ -14730,9 +14713,9 @@
               <a:buNone/>
             </a:pPr>
             <a:r>
-              <a:rPr lang="es-ES" sz="2800" b="1" dirty="0">
-                <a:solidFill>
-                  <a:srgbClr val="E8E6E8"/>
+              <a:rPr lang="es-ES" sz="6600" b="1" dirty="0">
+                <a:solidFill>
+                  <a:schemeClr val="lt1"/>
                 </a:solidFill>
                 <a:latin typeface="Calibri"/>
                 <a:ea typeface="Calibri"/>
@@ -14741,139 +14724,13 @@
               </a:rPr>
               <a:t>CAPÍTULO 10.</a:t>
             </a:r>
-          </a:p>
-        </p:txBody>
-      </p:sp>
-      <p:sp>
-        <p:nvSpPr>
-          <p:cNvPr id="131" name="Shape 131"/>
-          <p:cNvSpPr txBox="1"/>
-          <p:nvPr/>
-        </p:nvSpPr>
-        <p:spPr>
-          <a:xfrm>
-            <a:off x="227852" y="144887"/>
-            <a:ext cx="1046968" cy="707885"/>
-          </a:xfrm>
-          <a:prstGeom prst="rect">
-            <a:avLst/>
-          </a:prstGeom>
-          <a:noFill/>
-          <a:ln>
-            <a:noFill/>
-          </a:ln>
-        </p:spPr>
-        <p:txBody>
-          <a:bodyPr wrap="square" lIns="91425" tIns="45700" rIns="91425" bIns="45700" anchor="t" anchorCtr="0">
-            <a:noAutofit/>
-          </a:bodyPr>
-          <a:lstStyle/>
-          <a:p>
-            <a:pPr marL="0" marR="0" lvl="0" indent="0" algn="l" rtl="0">
-              <a:spcBef>
-                <a:spcPts val="0"/>
-              </a:spcBef>
-              <a:buSzPct val="25000"/>
-              <a:buNone/>
-            </a:pPr>
-            <a:r>
-              <a:rPr lang="es-ES" sz="3200" b="1" dirty="0">
-                <a:solidFill>
-                  <a:srgbClr val="E8E6E8"/>
-                </a:solidFill>
-                <a:latin typeface="Calibri"/>
-                <a:ea typeface="Calibri"/>
-                <a:cs typeface="Calibri"/>
-                <a:sym typeface="Calibri"/>
-              </a:rPr>
-              <a:t>1.</a:t>
-            </a:r>
-          </a:p>
-        </p:txBody>
-      </p:sp>
-      <p:sp>
-        <p:nvSpPr>
-          <p:cNvPr id="133" name="Shape 133"/>
-          <p:cNvSpPr txBox="1"/>
-          <p:nvPr/>
-        </p:nvSpPr>
-        <p:spPr>
-          <a:xfrm>
-            <a:off x="494436" y="1405816"/>
-            <a:ext cx="7407469" cy="400109"/>
-          </a:xfrm>
-          <a:prstGeom prst="rect">
-            <a:avLst/>
-          </a:prstGeom>
-          <a:noFill/>
-          <a:ln>
-            <a:noFill/>
-          </a:ln>
-        </p:spPr>
-        <p:txBody>
-          <a:bodyPr wrap="square" lIns="91425" tIns="45700" rIns="91425" bIns="45700" anchor="t" anchorCtr="0">
-            <a:noAutofit/>
-          </a:bodyPr>
-          <a:lstStyle/>
-          <a:p>
-            <a:pPr lvl="0">
-              <a:buSzPct val="25000"/>
-            </a:pPr>
-            <a:r>
-              <a:rPr lang="es-ES" sz="2000" b="1" dirty="0">
-                <a:solidFill>
-                  <a:srgbClr val="5E5C5D"/>
-                </a:solidFill>
-                <a:latin typeface="Calibri"/>
-                <a:ea typeface="Calibri"/>
-                <a:cs typeface="Calibri"/>
-                <a:sym typeface="Calibri"/>
-              </a:rPr>
-              <a:t>CRONOGRAMA</a:t>
-            </a:r>
-          </a:p>
-        </p:txBody>
-      </p:sp>
-      <p:sp>
-        <p:nvSpPr>
-          <p:cNvPr id="136" name="Shape 136"/>
-          <p:cNvSpPr txBox="1"/>
-          <p:nvPr/>
-        </p:nvSpPr>
-        <p:spPr>
-          <a:xfrm>
-            <a:off x="560356" y="1651083"/>
-            <a:ext cx="7762160" cy="3548316"/>
-          </a:xfrm>
-          <a:prstGeom prst="rect">
-            <a:avLst/>
-          </a:prstGeom>
-          <a:noFill/>
-          <a:ln>
-            <a:noFill/>
-          </a:ln>
-        </p:spPr>
-        <p:txBody>
-          <a:bodyPr wrap="square" lIns="91425" tIns="45700" rIns="91425" bIns="45700" anchor="t" anchorCtr="0">
-            <a:noAutofit/>
-          </a:bodyPr>
-          <a:lstStyle/>
-          <a:p>
-            <a:pPr algn="just"/>
-            <a:endParaRPr lang="es-ES" sz="1800" dirty="0">
-              <a:solidFill>
-                <a:srgbClr val="5E5C5D"/>
-              </a:solidFill>
-              <a:latin typeface="Calibri" panose="020F0502020204030204" pitchFamily="34" charset="0"/>
-              <a:cs typeface="Calibri" panose="020F0502020204030204" pitchFamily="34" charset="0"/>
-            </a:endParaRPr>
           </a:p>
         </p:txBody>
       </p:sp>
     </p:spTree>
     <p:extLst>
       <p:ext uri="{BB962C8B-B14F-4D97-AF65-F5344CB8AC3E}">
-        <p14:creationId xmlns:p14="http://schemas.microsoft.com/office/powerpoint/2010/main" val="3919576655"/>
+        <p14:creationId xmlns:p14="http://schemas.microsoft.com/office/powerpoint/2010/main" val="1136970480"/>
       </p:ext>
     </p:extLst>
   </p:cSld>
@@ -14908,6 +14765,209 @@
         </p:nvSpPr>
         <p:spPr>
           <a:xfrm>
+            <a:off x="751336" y="190098"/>
+            <a:ext cx="3239373" cy="707886"/>
+          </a:xfrm>
+          <a:prstGeom prst="rect">
+            <a:avLst/>
+          </a:prstGeom>
+          <a:noFill/>
+          <a:ln>
+            <a:noFill/>
+          </a:ln>
+        </p:spPr>
+        <p:txBody>
+          <a:bodyPr wrap="square" lIns="91425" tIns="45700" rIns="91425" bIns="45700" anchor="t" anchorCtr="0">
+            <a:noAutofit/>
+          </a:bodyPr>
+          <a:lstStyle/>
+          <a:p>
+            <a:pPr marL="0" marR="0" lvl="0" indent="0" algn="l" rtl="0">
+              <a:spcBef>
+                <a:spcPts val="0"/>
+              </a:spcBef>
+              <a:buSzPct val="25000"/>
+              <a:buNone/>
+            </a:pPr>
+            <a:r>
+              <a:rPr lang="es-ES" sz="2800" b="1" dirty="0">
+                <a:solidFill>
+                  <a:srgbClr val="E8E6E8"/>
+                </a:solidFill>
+                <a:latin typeface="Calibri"/>
+                <a:ea typeface="Calibri"/>
+                <a:cs typeface="Calibri"/>
+                <a:sym typeface="Calibri"/>
+              </a:rPr>
+              <a:t>CAPÍTULO 10.</a:t>
+            </a:r>
+          </a:p>
+        </p:txBody>
+      </p:sp>
+      <p:sp>
+        <p:nvSpPr>
+          <p:cNvPr id="131" name="Shape 131"/>
+          <p:cNvSpPr txBox="1"/>
+          <p:nvPr/>
+        </p:nvSpPr>
+        <p:spPr>
+          <a:xfrm>
+            <a:off x="227852" y="144887"/>
+            <a:ext cx="1046968" cy="707885"/>
+          </a:xfrm>
+          <a:prstGeom prst="rect">
+            <a:avLst/>
+          </a:prstGeom>
+          <a:noFill/>
+          <a:ln>
+            <a:noFill/>
+          </a:ln>
+        </p:spPr>
+        <p:txBody>
+          <a:bodyPr wrap="square" lIns="91425" tIns="45700" rIns="91425" bIns="45700" anchor="t" anchorCtr="0">
+            <a:noAutofit/>
+          </a:bodyPr>
+          <a:lstStyle/>
+          <a:p>
+            <a:pPr marL="0" marR="0" lvl="0" indent="0" algn="l" rtl="0">
+              <a:spcBef>
+                <a:spcPts val="0"/>
+              </a:spcBef>
+              <a:buSzPct val="25000"/>
+              <a:buNone/>
+            </a:pPr>
+            <a:r>
+              <a:rPr lang="es-ES" sz="3200" b="1" dirty="0">
+                <a:solidFill>
+                  <a:srgbClr val="E8E6E8"/>
+                </a:solidFill>
+                <a:latin typeface="Calibri"/>
+                <a:ea typeface="Calibri"/>
+                <a:cs typeface="Calibri"/>
+                <a:sym typeface="Calibri"/>
+              </a:rPr>
+              <a:t>1.</a:t>
+            </a:r>
+          </a:p>
+        </p:txBody>
+      </p:sp>
+      <p:sp>
+        <p:nvSpPr>
+          <p:cNvPr id="133" name="Shape 133"/>
+          <p:cNvSpPr txBox="1"/>
+          <p:nvPr/>
+        </p:nvSpPr>
+        <p:spPr>
+          <a:xfrm>
+            <a:off x="494436" y="1405816"/>
+            <a:ext cx="7407469" cy="400109"/>
+          </a:xfrm>
+          <a:prstGeom prst="rect">
+            <a:avLst/>
+          </a:prstGeom>
+          <a:noFill/>
+          <a:ln>
+            <a:noFill/>
+          </a:ln>
+        </p:spPr>
+        <p:txBody>
+          <a:bodyPr wrap="square" lIns="91425" tIns="45700" rIns="91425" bIns="45700" anchor="t" anchorCtr="0">
+            <a:noAutofit/>
+          </a:bodyPr>
+          <a:lstStyle/>
+          <a:p>
+            <a:pPr lvl="0">
+              <a:buSzPct val="25000"/>
+            </a:pPr>
+            <a:r>
+              <a:rPr lang="es-ES" sz="2000" b="1" dirty="0">
+                <a:solidFill>
+                  <a:srgbClr val="5E5C5D"/>
+                </a:solidFill>
+                <a:latin typeface="Calibri"/>
+                <a:ea typeface="Calibri"/>
+                <a:cs typeface="Calibri"/>
+                <a:sym typeface="Calibri"/>
+              </a:rPr>
+              <a:t>CRONOGRAMA</a:t>
+            </a:r>
+          </a:p>
+        </p:txBody>
+      </p:sp>
+      <p:sp>
+        <p:nvSpPr>
+          <p:cNvPr id="136" name="Shape 136"/>
+          <p:cNvSpPr txBox="1"/>
+          <p:nvPr/>
+        </p:nvSpPr>
+        <p:spPr>
+          <a:xfrm>
+            <a:off x="560356" y="1651083"/>
+            <a:ext cx="7762160" cy="3548316"/>
+          </a:xfrm>
+          <a:prstGeom prst="rect">
+            <a:avLst/>
+          </a:prstGeom>
+          <a:noFill/>
+          <a:ln>
+            <a:noFill/>
+          </a:ln>
+        </p:spPr>
+        <p:txBody>
+          <a:bodyPr wrap="square" lIns="91425" tIns="45700" rIns="91425" bIns="45700" anchor="t" anchorCtr="0">
+            <a:noAutofit/>
+          </a:bodyPr>
+          <a:lstStyle/>
+          <a:p>
+            <a:pPr algn="just"/>
+            <a:endParaRPr lang="es-ES" sz="1800" dirty="0">
+              <a:solidFill>
+                <a:srgbClr val="5E5C5D"/>
+              </a:solidFill>
+              <a:latin typeface="Calibri" panose="020F0502020204030204" pitchFamily="34" charset="0"/>
+              <a:cs typeface="Calibri" panose="020F0502020204030204" pitchFamily="34" charset="0"/>
+            </a:endParaRPr>
+          </a:p>
+        </p:txBody>
+      </p:sp>
+    </p:spTree>
+    <p:extLst>
+      <p:ext uri="{BB962C8B-B14F-4D97-AF65-F5344CB8AC3E}">
+        <p14:creationId xmlns:p14="http://schemas.microsoft.com/office/powerpoint/2010/main" val="3919576655"/>
+      </p:ext>
+    </p:extLst>
+  </p:cSld>
+  <p:clrMapOvr>
+    <a:masterClrMapping/>
+  </p:clrMapOvr>
+</p:sld>
+</file>
+
+<file path=ppt/slides/slide42.xml><?xml version="1.0" encoding="utf-8"?>
+<p:sld xmlns:a="http://schemas.openxmlformats.org/drawingml/2006/main" xmlns:r="http://schemas.openxmlformats.org/officeDocument/2006/relationships" xmlns:p="http://schemas.openxmlformats.org/presentationml/2006/main">
+  <p:cSld>
+    <p:spTree>
+      <p:nvGrpSpPr>
+        <p:cNvPr id="1" name="Shape 129"/>
+        <p:cNvGrpSpPr/>
+        <p:nvPr/>
+      </p:nvGrpSpPr>
+      <p:grpSpPr>
+        <a:xfrm>
+          <a:off x="0" y="0"/>
+          <a:ext cx="0" cy="0"/>
+          <a:chOff x="0" y="0"/>
+          <a:chExt cx="0" cy="0"/>
+        </a:xfrm>
+      </p:grpSpPr>
+      <p:sp>
+        <p:nvSpPr>
+          <p:cNvPr id="130" name="Shape 130"/>
+          <p:cNvSpPr txBox="1"/>
+          <p:nvPr/>
+        </p:nvSpPr>
+        <p:spPr>
+          <a:xfrm>
             <a:off x="1065035" y="213122"/>
             <a:ext cx="3239373" cy="707886"/>
           </a:xfrm>
@@ -15086,7 +15146,7 @@
 </p:sld>
 </file>
 
-<file path=ppt/slides/slide42.xml><?xml version="1.0" encoding="utf-8"?>
+<file path=ppt/slides/slide43.xml><?xml version="1.0" encoding="utf-8"?>
 <p:sld xmlns:a="http://schemas.openxmlformats.org/drawingml/2006/main" xmlns:r="http://schemas.openxmlformats.org/officeDocument/2006/relationships" xmlns:p="http://schemas.openxmlformats.org/presentationml/2006/main">
   <p:cSld>
     <p:spTree>
@@ -15163,7 +15223,7 @@
 </p:sld>
 </file>
 
-<file path=ppt/slides/slide43.xml><?xml version="1.0" encoding="utf-8"?>
+<file path=ppt/slides/slide44.xml><?xml version="1.0" encoding="utf-8"?>
 <p:sld xmlns:a="http://schemas.openxmlformats.org/drawingml/2006/main" xmlns:r="http://schemas.openxmlformats.org/officeDocument/2006/relationships" xmlns:p="http://schemas.openxmlformats.org/presentationml/2006/main">
   <p:cSld>
     <p:spTree>
@@ -15366,7 +15426,7 @@
 </p:sld>
 </file>
 
-<file path=ppt/slides/slide44.xml><?xml version="1.0" encoding="utf-8"?>
+<file path=ppt/slides/slide45.xml><?xml version="1.0" encoding="utf-8"?>
 <p:sld xmlns:a="http://schemas.openxmlformats.org/drawingml/2006/main" xmlns:r="http://schemas.openxmlformats.org/officeDocument/2006/relationships" xmlns:p="http://schemas.openxmlformats.org/presentationml/2006/main">
   <p:cSld>
     <p:spTree>
@@ -15443,7 +15503,7 @@
 </p:sld>
 </file>
 
-<file path=ppt/slides/slide45.xml><?xml version="1.0" encoding="utf-8"?>
+<file path=ppt/slides/slide46.xml><?xml version="1.0" encoding="utf-8"?>
 <p:sld xmlns:a="http://schemas.openxmlformats.org/drawingml/2006/main" xmlns:r="http://schemas.openxmlformats.org/officeDocument/2006/relationships" xmlns:p="http://schemas.openxmlformats.org/presentationml/2006/main">
   <p:cSld>
     <p:spTree>
@@ -15646,7 +15706,7 @@
 </p:sld>
 </file>
 
-<file path=ppt/slides/slide46.xml><?xml version="1.0" encoding="utf-8"?>
+<file path=ppt/slides/slide47.xml><?xml version="1.0" encoding="utf-8"?>
 <p:sld xmlns:a="http://schemas.openxmlformats.org/drawingml/2006/main" xmlns:r="http://schemas.openxmlformats.org/officeDocument/2006/relationships" xmlns:p="http://schemas.openxmlformats.org/presentationml/2006/main">
   <p:cSld>
     <p:spTree>
@@ -15723,7 +15783,7 @@
 </p:sld>
 </file>
 
-<file path=ppt/slides/slide47.xml><?xml version="1.0" encoding="utf-8"?>
+<file path=ppt/slides/slide48.xml><?xml version="1.0" encoding="utf-8"?>
 <p:sld xmlns:a="http://schemas.openxmlformats.org/drawingml/2006/main" xmlns:r="http://schemas.openxmlformats.org/officeDocument/2006/relationships" xmlns:p="http://schemas.openxmlformats.org/presentationml/2006/main">
   <p:cSld>
     <p:spTree>
@@ -15926,7 +15986,7 @@
 </p:sld>
 </file>
 
-<file path=ppt/slides/slide48.xml><?xml version="1.0" encoding="utf-8"?>
+<file path=ppt/slides/slide49.xml><?xml version="1.0" encoding="utf-8"?>
 <p:sld xmlns:a="http://schemas.openxmlformats.org/drawingml/2006/main" xmlns:r="http://schemas.openxmlformats.org/officeDocument/2006/relationships" xmlns:p="http://schemas.openxmlformats.org/presentationml/2006/main">
   <p:cSld>
     <p:spTree>
@@ -15994,206 +16054,6 @@
     <p:extLst>
       <p:ext uri="{BB962C8B-B14F-4D97-AF65-F5344CB8AC3E}">
         <p14:creationId xmlns:p14="http://schemas.microsoft.com/office/powerpoint/2010/main" val="3717287509"/>
-      </p:ext>
-    </p:extLst>
-  </p:cSld>
-  <p:clrMapOvr>
-    <a:masterClrMapping/>
-  </p:clrMapOvr>
-</p:sld>
-</file>
-
-<file path=ppt/slides/slide49.xml><?xml version="1.0" encoding="utf-8"?>
-<p:sld xmlns:a="http://schemas.openxmlformats.org/drawingml/2006/main" xmlns:r="http://schemas.openxmlformats.org/officeDocument/2006/relationships" xmlns:p="http://schemas.openxmlformats.org/presentationml/2006/main">
-  <p:cSld>
-    <p:spTree>
-      <p:nvGrpSpPr>
-        <p:cNvPr id="1" name="Shape 129"/>
-        <p:cNvGrpSpPr/>
-        <p:nvPr/>
-      </p:nvGrpSpPr>
-      <p:grpSpPr>
-        <a:xfrm>
-          <a:off x="0" y="0"/>
-          <a:ext cx="0" cy="0"/>
-          <a:chOff x="0" y="0"/>
-          <a:chExt cx="0" cy="0"/>
-        </a:xfrm>
-      </p:grpSpPr>
-      <p:sp>
-        <p:nvSpPr>
-          <p:cNvPr id="130" name="Shape 130"/>
-          <p:cNvSpPr txBox="1"/>
-          <p:nvPr/>
-        </p:nvSpPr>
-        <p:spPr>
-          <a:xfrm>
-            <a:off x="1065035" y="213122"/>
-            <a:ext cx="3239373" cy="707886"/>
-          </a:xfrm>
-          <a:prstGeom prst="rect">
-            <a:avLst/>
-          </a:prstGeom>
-          <a:noFill/>
-          <a:ln>
-            <a:noFill/>
-          </a:ln>
-        </p:spPr>
-        <p:txBody>
-          <a:bodyPr wrap="square" lIns="91425" tIns="45700" rIns="91425" bIns="45700" anchor="t" anchorCtr="0">
-            <a:noAutofit/>
-          </a:bodyPr>
-          <a:lstStyle/>
-          <a:p>
-            <a:pPr marL="0" marR="0" lvl="0" indent="0" algn="l" rtl="0">
-              <a:spcBef>
-                <a:spcPts val="0"/>
-              </a:spcBef>
-              <a:buSzPct val="25000"/>
-              <a:buNone/>
-            </a:pPr>
-            <a:r>
-              <a:rPr lang="es-ES" sz="2800" b="1" dirty="0">
-                <a:solidFill>
-                  <a:srgbClr val="E8E6E8"/>
-                </a:solidFill>
-                <a:latin typeface="Calibri"/>
-                <a:ea typeface="Calibri"/>
-                <a:cs typeface="Calibri"/>
-                <a:sym typeface="Calibri"/>
-              </a:rPr>
-              <a:t>CAPÍTULO 14.</a:t>
-            </a:r>
-          </a:p>
-        </p:txBody>
-      </p:sp>
-      <p:sp>
-        <p:nvSpPr>
-          <p:cNvPr id="131" name="Shape 131"/>
-          <p:cNvSpPr txBox="1"/>
-          <p:nvPr/>
-        </p:nvSpPr>
-        <p:spPr>
-          <a:xfrm>
-            <a:off x="227852" y="144887"/>
-            <a:ext cx="1046968" cy="707885"/>
-          </a:xfrm>
-          <a:prstGeom prst="rect">
-            <a:avLst/>
-          </a:prstGeom>
-          <a:noFill/>
-          <a:ln>
-            <a:noFill/>
-          </a:ln>
-        </p:spPr>
-        <p:txBody>
-          <a:bodyPr wrap="square" lIns="91425" tIns="45700" rIns="91425" bIns="45700" anchor="t" anchorCtr="0">
-            <a:noAutofit/>
-          </a:bodyPr>
-          <a:lstStyle/>
-          <a:p>
-            <a:pPr marL="0" marR="0" lvl="0" indent="0" algn="l" rtl="0">
-              <a:spcBef>
-                <a:spcPts val="0"/>
-              </a:spcBef>
-              <a:buSzPct val="25000"/>
-              <a:buNone/>
-            </a:pPr>
-            <a:r>
-              <a:rPr lang="es-ES" sz="3200" b="1" dirty="0">
-                <a:solidFill>
-                  <a:srgbClr val="E8E6E8"/>
-                </a:solidFill>
-                <a:latin typeface="Calibri"/>
-                <a:ea typeface="Calibri"/>
-                <a:cs typeface="Calibri"/>
-                <a:sym typeface="Calibri"/>
-              </a:rPr>
-              <a:t>1.</a:t>
-            </a:r>
-          </a:p>
-        </p:txBody>
-      </p:sp>
-      <p:sp>
-        <p:nvSpPr>
-          <p:cNvPr id="133" name="Shape 133"/>
-          <p:cNvSpPr txBox="1"/>
-          <p:nvPr/>
-        </p:nvSpPr>
-        <p:spPr>
-          <a:xfrm>
-            <a:off x="494436" y="1218931"/>
-            <a:ext cx="7407469" cy="400109"/>
-          </a:xfrm>
-          <a:prstGeom prst="rect">
-            <a:avLst/>
-          </a:prstGeom>
-          <a:noFill/>
-          <a:ln>
-            <a:noFill/>
-          </a:ln>
-        </p:spPr>
-        <p:txBody>
-          <a:bodyPr wrap="square" lIns="91425" tIns="45700" rIns="91425" bIns="45700" anchor="t" anchorCtr="0">
-            <a:noAutofit/>
-          </a:bodyPr>
-          <a:lstStyle/>
-          <a:p>
-            <a:pPr lvl="0">
-              <a:buSzPct val="25000"/>
-            </a:pPr>
-            <a:endParaRPr lang="es-ES" sz="2000" b="1" dirty="0">
-              <a:solidFill>
-                <a:srgbClr val="5E5C5D"/>
-              </a:solidFill>
-              <a:latin typeface="Calibri"/>
-              <a:ea typeface="Calibri"/>
-              <a:cs typeface="Calibri"/>
-              <a:sym typeface="Calibri"/>
-            </a:endParaRPr>
-          </a:p>
-        </p:txBody>
-      </p:sp>
-      <p:sp>
-        <p:nvSpPr>
-          <p:cNvPr id="136" name="Shape 136"/>
-          <p:cNvSpPr txBox="1"/>
-          <p:nvPr/>
-        </p:nvSpPr>
-        <p:spPr>
-          <a:xfrm>
-            <a:off x="494436" y="1619040"/>
-            <a:ext cx="7762160" cy="3548316"/>
-          </a:xfrm>
-          <a:prstGeom prst="rect">
-            <a:avLst/>
-          </a:prstGeom>
-          <a:noFill/>
-          <a:ln>
-            <a:noFill/>
-          </a:ln>
-        </p:spPr>
-        <p:txBody>
-          <a:bodyPr wrap="square" lIns="91425" tIns="45700" rIns="91425" bIns="45700" anchor="t" anchorCtr="0">
-            <a:noAutofit/>
-          </a:bodyPr>
-          <a:lstStyle/>
-          <a:p>
-            <a:pPr algn="just"/>
-            <a:endParaRPr lang="es-ES" sz="1800" dirty="0">
-              <a:solidFill>
-                <a:srgbClr val="5E5C5D"/>
-              </a:solidFill>
-              <a:latin typeface="Calibri" panose="020F0502020204030204" pitchFamily="34" charset="0"/>
-              <a:cs typeface="Calibri" panose="020F0502020204030204" pitchFamily="34" charset="0"/>
-            </a:endParaRPr>
-          </a:p>
-        </p:txBody>
-      </p:sp>
-    </p:spTree>
-    <p:extLst>
-      <p:ext uri="{BB962C8B-B14F-4D97-AF65-F5344CB8AC3E}">
-        <p14:creationId xmlns:p14="http://schemas.microsoft.com/office/powerpoint/2010/main" val="4052791673"/>
       </p:ext>
     </p:extLst>
   </p:cSld>
@@ -16451,6 +16311,206 @@
   <p:cSld>
     <p:spTree>
       <p:nvGrpSpPr>
+        <p:cNvPr id="1" name="Shape 129"/>
+        <p:cNvGrpSpPr/>
+        <p:nvPr/>
+      </p:nvGrpSpPr>
+      <p:grpSpPr>
+        <a:xfrm>
+          <a:off x="0" y="0"/>
+          <a:ext cx="0" cy="0"/>
+          <a:chOff x="0" y="0"/>
+          <a:chExt cx="0" cy="0"/>
+        </a:xfrm>
+      </p:grpSpPr>
+      <p:sp>
+        <p:nvSpPr>
+          <p:cNvPr id="130" name="Shape 130"/>
+          <p:cNvSpPr txBox="1"/>
+          <p:nvPr/>
+        </p:nvSpPr>
+        <p:spPr>
+          <a:xfrm>
+            <a:off x="1065035" y="213122"/>
+            <a:ext cx="3239373" cy="707886"/>
+          </a:xfrm>
+          <a:prstGeom prst="rect">
+            <a:avLst/>
+          </a:prstGeom>
+          <a:noFill/>
+          <a:ln>
+            <a:noFill/>
+          </a:ln>
+        </p:spPr>
+        <p:txBody>
+          <a:bodyPr wrap="square" lIns="91425" tIns="45700" rIns="91425" bIns="45700" anchor="t" anchorCtr="0">
+            <a:noAutofit/>
+          </a:bodyPr>
+          <a:lstStyle/>
+          <a:p>
+            <a:pPr marL="0" marR="0" lvl="0" indent="0" algn="l" rtl="0">
+              <a:spcBef>
+                <a:spcPts val="0"/>
+              </a:spcBef>
+              <a:buSzPct val="25000"/>
+              <a:buNone/>
+            </a:pPr>
+            <a:r>
+              <a:rPr lang="es-ES" sz="2800" b="1" dirty="0">
+                <a:solidFill>
+                  <a:srgbClr val="E8E6E8"/>
+                </a:solidFill>
+                <a:latin typeface="Calibri"/>
+                <a:ea typeface="Calibri"/>
+                <a:cs typeface="Calibri"/>
+                <a:sym typeface="Calibri"/>
+              </a:rPr>
+              <a:t>CAPÍTULO 14.</a:t>
+            </a:r>
+          </a:p>
+        </p:txBody>
+      </p:sp>
+      <p:sp>
+        <p:nvSpPr>
+          <p:cNvPr id="131" name="Shape 131"/>
+          <p:cNvSpPr txBox="1"/>
+          <p:nvPr/>
+        </p:nvSpPr>
+        <p:spPr>
+          <a:xfrm>
+            <a:off x="227852" y="144887"/>
+            <a:ext cx="1046968" cy="707885"/>
+          </a:xfrm>
+          <a:prstGeom prst="rect">
+            <a:avLst/>
+          </a:prstGeom>
+          <a:noFill/>
+          <a:ln>
+            <a:noFill/>
+          </a:ln>
+        </p:spPr>
+        <p:txBody>
+          <a:bodyPr wrap="square" lIns="91425" tIns="45700" rIns="91425" bIns="45700" anchor="t" anchorCtr="0">
+            <a:noAutofit/>
+          </a:bodyPr>
+          <a:lstStyle/>
+          <a:p>
+            <a:pPr marL="0" marR="0" lvl="0" indent="0" algn="l" rtl="0">
+              <a:spcBef>
+                <a:spcPts val="0"/>
+              </a:spcBef>
+              <a:buSzPct val="25000"/>
+              <a:buNone/>
+            </a:pPr>
+            <a:r>
+              <a:rPr lang="es-ES" sz="3200" b="1" dirty="0">
+                <a:solidFill>
+                  <a:srgbClr val="E8E6E8"/>
+                </a:solidFill>
+                <a:latin typeface="Calibri"/>
+                <a:ea typeface="Calibri"/>
+                <a:cs typeface="Calibri"/>
+                <a:sym typeface="Calibri"/>
+              </a:rPr>
+              <a:t>1.</a:t>
+            </a:r>
+          </a:p>
+        </p:txBody>
+      </p:sp>
+      <p:sp>
+        <p:nvSpPr>
+          <p:cNvPr id="133" name="Shape 133"/>
+          <p:cNvSpPr txBox="1"/>
+          <p:nvPr/>
+        </p:nvSpPr>
+        <p:spPr>
+          <a:xfrm>
+            <a:off x="494436" y="1218931"/>
+            <a:ext cx="7407469" cy="400109"/>
+          </a:xfrm>
+          <a:prstGeom prst="rect">
+            <a:avLst/>
+          </a:prstGeom>
+          <a:noFill/>
+          <a:ln>
+            <a:noFill/>
+          </a:ln>
+        </p:spPr>
+        <p:txBody>
+          <a:bodyPr wrap="square" lIns="91425" tIns="45700" rIns="91425" bIns="45700" anchor="t" anchorCtr="0">
+            <a:noAutofit/>
+          </a:bodyPr>
+          <a:lstStyle/>
+          <a:p>
+            <a:pPr lvl="0">
+              <a:buSzPct val="25000"/>
+            </a:pPr>
+            <a:endParaRPr lang="es-ES" sz="2000" b="1" dirty="0">
+              <a:solidFill>
+                <a:srgbClr val="5E5C5D"/>
+              </a:solidFill>
+              <a:latin typeface="Calibri"/>
+              <a:ea typeface="Calibri"/>
+              <a:cs typeface="Calibri"/>
+              <a:sym typeface="Calibri"/>
+            </a:endParaRPr>
+          </a:p>
+        </p:txBody>
+      </p:sp>
+      <p:sp>
+        <p:nvSpPr>
+          <p:cNvPr id="136" name="Shape 136"/>
+          <p:cNvSpPr txBox="1"/>
+          <p:nvPr/>
+        </p:nvSpPr>
+        <p:spPr>
+          <a:xfrm>
+            <a:off x="494436" y="1619040"/>
+            <a:ext cx="7762160" cy="3548316"/>
+          </a:xfrm>
+          <a:prstGeom prst="rect">
+            <a:avLst/>
+          </a:prstGeom>
+          <a:noFill/>
+          <a:ln>
+            <a:noFill/>
+          </a:ln>
+        </p:spPr>
+        <p:txBody>
+          <a:bodyPr wrap="square" lIns="91425" tIns="45700" rIns="91425" bIns="45700" anchor="t" anchorCtr="0">
+            <a:noAutofit/>
+          </a:bodyPr>
+          <a:lstStyle/>
+          <a:p>
+            <a:pPr algn="just"/>
+            <a:endParaRPr lang="es-ES" sz="1800" dirty="0">
+              <a:solidFill>
+                <a:srgbClr val="5E5C5D"/>
+              </a:solidFill>
+              <a:latin typeface="Calibri" panose="020F0502020204030204" pitchFamily="34" charset="0"/>
+              <a:cs typeface="Calibri" panose="020F0502020204030204" pitchFamily="34" charset="0"/>
+            </a:endParaRPr>
+          </a:p>
+        </p:txBody>
+      </p:sp>
+    </p:spTree>
+    <p:extLst>
+      <p:ext uri="{BB962C8B-B14F-4D97-AF65-F5344CB8AC3E}">
+        <p14:creationId xmlns:p14="http://schemas.microsoft.com/office/powerpoint/2010/main" val="4052791673"/>
+      </p:ext>
+    </p:extLst>
+  </p:cSld>
+  <p:clrMapOvr>
+    <a:masterClrMapping/>
+  </p:clrMapOvr>
+</p:sld>
+</file>
+
+<file path=ppt/slides/slide51.xml><?xml version="1.0" encoding="utf-8"?>
+<p:sld xmlns:a="http://schemas.openxmlformats.org/drawingml/2006/main" xmlns:r="http://schemas.openxmlformats.org/officeDocument/2006/relationships" xmlns:p="http://schemas.openxmlformats.org/presentationml/2006/main">
+  <p:cSld>
+    <p:spTree>
+      <p:nvGrpSpPr>
         <p:cNvPr id="1" name="Shape 141"/>
         <p:cNvGrpSpPr/>
         <p:nvPr/>
@@ -16744,7 +16804,7 @@
 </p:sld>
 </file>
 
-<file path=ppt/slides/slide51.xml><?xml version="1.0" encoding="utf-8"?>
+<file path=ppt/slides/slide52.xml><?xml version="1.0" encoding="utf-8"?>
 <p:sld xmlns:a="http://schemas.openxmlformats.org/drawingml/2006/main" xmlns:r="http://schemas.openxmlformats.org/officeDocument/2006/relationships" xmlns:p="http://schemas.openxmlformats.org/presentationml/2006/main">
   <p:cSld>
     <p:spTree>
@@ -18926,7 +18986,7 @@
 </p:sld>
 </file>
 
-<file path=ppt/slides/slide52.xml><?xml version="1.0" encoding="utf-8"?>
+<file path=ppt/slides/slide53.xml><?xml version="1.0" encoding="utf-8"?>
 <p:sld xmlns:a="http://schemas.openxmlformats.org/drawingml/2006/main" xmlns:r="http://schemas.openxmlformats.org/officeDocument/2006/relationships" xmlns:p="http://schemas.openxmlformats.org/presentationml/2006/main">
   <p:cSld>
     <p:spTree>
@@ -19224,7 +19284,7 @@
 </p:sld>
 </file>
 
-<file path=ppt/slides/slide53.xml><?xml version="1.0" encoding="utf-8"?>
+<file path=ppt/slides/slide54.xml><?xml version="1.0" encoding="utf-8"?>
 <p:sld xmlns:a="http://schemas.openxmlformats.org/drawingml/2006/main" xmlns:r="http://schemas.openxmlformats.org/officeDocument/2006/relationships" xmlns:p="http://schemas.openxmlformats.org/presentationml/2006/main">
   <p:cSld>
     <p:spTree>
@@ -19669,7 +19729,7 @@
 </p:sld>
 </file>
 
-<file path=ppt/slides/slide54.xml><?xml version="1.0" encoding="utf-8"?>
+<file path=ppt/slides/slide55.xml><?xml version="1.0" encoding="utf-8"?>
 <p:sld xmlns:a="http://schemas.openxmlformats.org/drawingml/2006/main" xmlns:r="http://schemas.openxmlformats.org/officeDocument/2006/relationships" xmlns:p="http://schemas.openxmlformats.org/presentationml/2006/main">
   <p:cSld>
     <p:spTree>
@@ -19741,7 +19801,7 @@
 </p:sld>
 </file>
 
-<file path=ppt/slides/slide55.xml><?xml version="1.0" encoding="utf-8"?>
+<file path=ppt/slides/slide56.xml><?xml version="1.0" encoding="utf-8"?>
 <p:sld xmlns:a="http://schemas.openxmlformats.org/drawingml/2006/main" xmlns:r="http://schemas.openxmlformats.org/officeDocument/2006/relationships" xmlns:p="http://schemas.openxmlformats.org/presentationml/2006/main">
   <p:cSld>
     <p:spTree>
@@ -20039,7 +20099,7 @@
 </p:sld>
 </file>
 
-<file path=ppt/slides/slide56.xml><?xml version="1.0" encoding="utf-8"?>
+<file path=ppt/slides/slide57.xml><?xml version="1.0" encoding="utf-8"?>
 <p:sld xmlns:a="http://schemas.openxmlformats.org/drawingml/2006/main" xmlns:r="http://schemas.openxmlformats.org/officeDocument/2006/relationships" xmlns:p="http://schemas.openxmlformats.org/presentationml/2006/main">
   <p:cSld>
     <p:spTree>
@@ -20484,7 +20544,7 @@
 </p:sld>
 </file>
 
-<file path=ppt/slides/slide57.xml><?xml version="1.0" encoding="utf-8"?>
+<file path=ppt/slides/slide58.xml><?xml version="1.0" encoding="utf-8"?>
 <p:sld xmlns:a="http://schemas.openxmlformats.org/drawingml/2006/main" xmlns:r="http://schemas.openxmlformats.org/officeDocument/2006/relationships" xmlns:p="http://schemas.openxmlformats.org/presentationml/2006/main">
   <p:cSld>
     <p:spTree>

</xml_diff>